<commit_message>
upload code by cza
</commit_message>
<xml_diff>
--- a/documents/clean_code/陈子昂-数博科技串讲.pptx
+++ b/documents/clean_code/陈子昂-数博科技串讲.pptx
@@ -5,10 +5,10 @@
     <p:sldMasterId id="2147483648" r:id="rId1"/>
   </p:sldMasterIdLst>
   <p:notesMasterIdLst>
-    <p:notesMasterId r:id="rId21"/>
+    <p:notesMasterId r:id="rId20"/>
   </p:notesMasterIdLst>
   <p:handoutMasterIdLst>
-    <p:handoutMasterId r:id="rId22"/>
+    <p:handoutMasterId r:id="rId21"/>
   </p:handoutMasterIdLst>
   <p:sldIdLst>
     <p:sldId id="281" r:id="rId3"/>
@@ -26,9 +26,8 @@
     <p:sldId id="286" r:id="rId15"/>
     <p:sldId id="297" r:id="rId16"/>
     <p:sldId id="337" r:id="rId17"/>
-    <p:sldId id="369" r:id="rId18"/>
-    <p:sldId id="303" r:id="rId19"/>
-    <p:sldId id="304" r:id="rId20"/>
+    <p:sldId id="303" r:id="rId18"/>
+    <p:sldId id="304" r:id="rId19"/>
   </p:sldIdLst>
   <p:sldSz cx="9144000" cy="5143500" type="screen16x9"/>
   <p:notesSz cx="6858000" cy="9144000"/>
@@ -5928,7 +5927,7 @@
                 <a:ea typeface="微软雅黑" panose="020B0503020204020204" charset="-122"/>
                 <a:sym typeface="Times New Roman" panose="02020603050405020304" pitchFamily="18" charset="0"/>
               </a:rPr>
-              <a:t>但对阅读代码部友好</a:t>
+              <a:t>但对阅读代码不友好</a:t>
             </a:r>
             <a:endParaRPr lang="zh-CN" altLang="en-US" sz="2200" dirty="0">
               <a:solidFill>
@@ -6875,512 +6874,6 @@
           </a:prstGeom>
         </p:spPr>
       </p:pic>
-    </p:spTree>
-  </p:cSld>
-  <p:clrMapOvr>
-    <a:masterClrMapping/>
-  </p:clrMapOvr>
-  <p:transition spd="slow">
-    <p:push dir="u"/>
-  </p:transition>
-  <p:timing>
-    <p:tnLst>
-      <p:par>
-        <p:cTn id="1" dur="indefinite" restart="never" nodeType="tmRoot"/>
-      </p:par>
-    </p:tnLst>
-  </p:timing>
-</p:sld>
-</file>
-
-<file path=ppt/slides/slide16.xml><?xml version="1.0" encoding="utf-8"?>
-<p:sld xmlns:a="http://schemas.openxmlformats.org/drawingml/2006/main" xmlns:r="http://schemas.openxmlformats.org/officeDocument/2006/relationships" xmlns:p="http://schemas.openxmlformats.org/presentationml/2006/main">
-  <p:cSld>
-    <p:spTree>
-      <p:nvGrpSpPr>
-        <p:cNvPr id="1" name=""/>
-        <p:cNvGrpSpPr/>
-        <p:nvPr/>
-      </p:nvGrpSpPr>
-      <p:grpSpPr>
-        <a:xfrm>
-          <a:off x="0" y="0"/>
-          <a:ext cx="0" cy="0"/>
-          <a:chOff x="0" y="0"/>
-          <a:chExt cx="0" cy="0"/>
-        </a:xfrm>
-      </p:grpSpPr>
-      <p:cxnSp>
-        <p:nvCxnSpPr>
-          <p:cNvPr id="11" name="直接连接符 10"/>
-          <p:cNvCxnSpPr/>
-          <p:nvPr/>
-        </p:nvCxnSpPr>
-        <p:spPr>
-          <a:xfrm>
-            <a:off x="467544" y="0"/>
-            <a:ext cx="0" cy="771550"/>
-          </a:xfrm>
-          <a:prstGeom prst="line">
-            <a:avLst/>
-          </a:prstGeom>
-          <a:ln w="38100">
-            <a:solidFill>
-              <a:schemeClr val="accent2"/>
-            </a:solidFill>
-          </a:ln>
-        </p:spPr>
-        <p:style>
-          <a:lnRef idx="1">
-            <a:schemeClr val="accent1"/>
-          </a:lnRef>
-          <a:fillRef idx="0">
-            <a:schemeClr val="accent1"/>
-          </a:fillRef>
-          <a:effectRef idx="0">
-            <a:schemeClr val="accent1"/>
-          </a:effectRef>
-          <a:fontRef idx="minor">
-            <a:schemeClr val="tx1"/>
-          </a:fontRef>
-        </p:style>
-      </p:cxnSp>
-      <p:cxnSp>
-        <p:nvCxnSpPr>
-          <p:cNvPr id="13" name="直接连接符 12"/>
-          <p:cNvCxnSpPr/>
-          <p:nvPr/>
-        </p:nvCxnSpPr>
-        <p:spPr>
-          <a:xfrm>
-            <a:off x="611560" y="0"/>
-            <a:ext cx="0" cy="771550"/>
-          </a:xfrm>
-          <a:prstGeom prst="line">
-            <a:avLst/>
-          </a:prstGeom>
-          <a:ln w="38100">
-            <a:solidFill>
-              <a:schemeClr val="accent2"/>
-            </a:solidFill>
-          </a:ln>
-        </p:spPr>
-        <p:style>
-          <a:lnRef idx="1">
-            <a:schemeClr val="accent1"/>
-          </a:lnRef>
-          <a:fillRef idx="0">
-            <a:schemeClr val="accent1"/>
-          </a:fillRef>
-          <a:effectRef idx="0">
-            <a:schemeClr val="accent1"/>
-          </a:effectRef>
-          <a:fontRef idx="minor">
-            <a:schemeClr val="tx1"/>
-          </a:fontRef>
-        </p:style>
-      </p:cxnSp>
-      <p:cxnSp>
-        <p:nvCxnSpPr>
-          <p:cNvPr id="15" name="直接连接符 14"/>
-          <p:cNvCxnSpPr/>
-          <p:nvPr/>
-        </p:nvCxnSpPr>
-        <p:spPr>
-          <a:xfrm>
-            <a:off x="8388424" y="4803998"/>
-            <a:ext cx="0" cy="339502"/>
-          </a:xfrm>
-          <a:prstGeom prst="line">
-            <a:avLst/>
-          </a:prstGeom>
-          <a:ln w="38100">
-            <a:solidFill>
-              <a:schemeClr val="accent2"/>
-            </a:solidFill>
-          </a:ln>
-        </p:spPr>
-        <p:style>
-          <a:lnRef idx="1">
-            <a:schemeClr val="accent1"/>
-          </a:lnRef>
-          <a:fillRef idx="0">
-            <a:schemeClr val="accent1"/>
-          </a:fillRef>
-          <a:effectRef idx="0">
-            <a:schemeClr val="accent1"/>
-          </a:effectRef>
-          <a:fontRef idx="minor">
-            <a:schemeClr val="tx1"/>
-          </a:fontRef>
-        </p:style>
-      </p:cxnSp>
-      <p:cxnSp>
-        <p:nvCxnSpPr>
-          <p:cNvPr id="17" name="直接连接符 16"/>
-          <p:cNvCxnSpPr/>
-          <p:nvPr/>
-        </p:nvCxnSpPr>
-        <p:spPr>
-          <a:xfrm>
-            <a:off x="8532440" y="4803998"/>
-            <a:ext cx="0" cy="339502"/>
-          </a:xfrm>
-          <a:prstGeom prst="line">
-            <a:avLst/>
-          </a:prstGeom>
-          <a:ln w="38100">
-            <a:solidFill>
-              <a:schemeClr val="accent2"/>
-            </a:solidFill>
-          </a:ln>
-        </p:spPr>
-        <p:style>
-          <a:lnRef idx="1">
-            <a:schemeClr val="accent1"/>
-          </a:lnRef>
-          <a:fillRef idx="0">
-            <a:schemeClr val="accent1"/>
-          </a:fillRef>
-          <a:effectRef idx="0">
-            <a:schemeClr val="accent1"/>
-          </a:effectRef>
-          <a:fontRef idx="minor">
-            <a:schemeClr val="tx1"/>
-          </a:fontRef>
-        </p:style>
-      </p:cxnSp>
-      <p:sp>
-        <p:nvSpPr>
-          <p:cNvPr id="20" name="TextBox 19"/>
-          <p:cNvSpPr txBox="1"/>
-          <p:nvPr/>
-        </p:nvSpPr>
-        <p:spPr>
-          <a:xfrm>
-            <a:off x="755576" y="57077"/>
-            <a:ext cx="2952328" cy="368300"/>
-          </a:xfrm>
-          <a:prstGeom prst="rect">
-            <a:avLst/>
-          </a:prstGeom>
-          <a:noFill/>
-        </p:spPr>
-        <p:txBody>
-          <a:bodyPr wrap="square" rtlCol="0">
-            <a:spAutoFit/>
-          </a:bodyPr>
-          <a:lstStyle/>
-          <a:p>
-            <a:r>
-              <a:rPr lang="zh-CN" altLang="en-US" dirty="0"/>
-              <a:t>代码规范</a:t>
-            </a:r>
-            <a:r>
-              <a:rPr lang="en-US" altLang="zh-CN" dirty="0"/>
-              <a:t>-</a:t>
-            </a:r>
-            <a:r>
-              <a:rPr lang="zh-CN" altLang="en-US" dirty="0"/>
-              <a:t>格式</a:t>
-            </a:r>
-            <a:endParaRPr lang="zh-CN" altLang="en-US" dirty="0"/>
-          </a:p>
-        </p:txBody>
-      </p:sp>
-      <p:sp>
-        <p:nvSpPr>
-          <p:cNvPr id="21" name="TextBox 20"/>
-          <p:cNvSpPr txBox="1"/>
-          <p:nvPr/>
-        </p:nvSpPr>
-        <p:spPr>
-          <a:xfrm>
-            <a:off x="755576" y="430347"/>
-            <a:ext cx="3240360" cy="245110"/>
-          </a:xfrm>
-          <a:prstGeom prst="rect">
-            <a:avLst/>
-          </a:prstGeom>
-          <a:noFill/>
-        </p:spPr>
-        <p:txBody>
-          <a:bodyPr wrap="square" rtlCol="0">
-            <a:spAutoFit/>
-          </a:bodyPr>
-          <a:lstStyle/>
-          <a:p>
-            <a:r>
-              <a:rPr lang="en-US" altLang="zh-CN" sz="1000" dirty="0">
-                <a:solidFill>
-                  <a:schemeClr val="tx1">
-                    <a:lumMod val="50000"/>
-                    <a:lumOff val="50000"/>
-                  </a:schemeClr>
-                </a:solidFill>
-              </a:rPr>
-              <a:t>format.</a:t>
-            </a:r>
-            <a:endParaRPr lang="zh-CN" altLang="en-US" sz="1000" dirty="0">
-              <a:solidFill>
-                <a:schemeClr val="tx1">
-                  <a:lumMod val="50000"/>
-                  <a:lumOff val="50000"/>
-                </a:schemeClr>
-              </a:solidFill>
-            </a:endParaRPr>
-          </a:p>
-        </p:txBody>
-      </p:sp>
-      <p:cxnSp>
-        <p:nvCxnSpPr>
-          <p:cNvPr id="23" name="直接连接符 22"/>
-          <p:cNvCxnSpPr/>
-          <p:nvPr/>
-        </p:nvCxnSpPr>
-        <p:spPr>
-          <a:xfrm>
-            <a:off x="749116" y="771550"/>
-            <a:ext cx="2958788" cy="0"/>
-          </a:xfrm>
-          <a:prstGeom prst="line">
-            <a:avLst/>
-          </a:prstGeom>
-        </p:spPr>
-        <p:style>
-          <a:lnRef idx="1">
-            <a:schemeClr val="accent1"/>
-          </a:lnRef>
-          <a:fillRef idx="0">
-            <a:schemeClr val="accent1"/>
-          </a:fillRef>
-          <a:effectRef idx="0">
-            <a:schemeClr val="accent1"/>
-          </a:effectRef>
-          <a:fontRef idx="minor">
-            <a:schemeClr val="tx1"/>
-          </a:fontRef>
-        </p:style>
-      </p:cxnSp>
-      <p:sp>
-        <p:nvSpPr>
-          <p:cNvPr id="8199" name="矩形 5"/>
-          <p:cNvSpPr>
-            <a:spLocks noChangeArrowheads="1"/>
-          </p:cNvSpPr>
-          <p:nvPr/>
-        </p:nvSpPr>
-        <p:spPr bwMode="auto">
-          <a:xfrm>
-            <a:off x="251143" y="888683"/>
-            <a:ext cx="8640762" cy="1346200"/>
-          </a:xfrm>
-          <a:prstGeom prst="rect">
-            <a:avLst/>
-          </a:prstGeom>
-          <a:noFill/>
-          <a:ln>
-            <a:noFill/>
-          </a:ln>
-          <a:extLst>
-            <a:ext uri="{909E8E84-426E-40DD-AFC4-6F175D3DCCD1}">
-              <a14:hiddenFill xmlns:a14="http://schemas.microsoft.com/office/drawing/2010/main">
-                <a:solidFill>
-                  <a:srgbClr val="FFFFFF"/>
-                </a:solidFill>
-              </a14:hiddenFill>
-            </a:ext>
-            <a:ext uri="{91240B29-F687-4F45-9708-019B960494DF}">
-              <a14:hiddenLine xmlns:a14="http://schemas.microsoft.com/office/drawing/2010/main" w="9525">
-                <a:solidFill>
-                  <a:srgbClr val="000000"/>
-                </a:solidFill>
-                <a:miter lim="800000"/>
-                <a:headEnd/>
-                <a:tailEnd/>
-              </a14:hiddenLine>
-            </a:ext>
-          </a:extLst>
-        </p:spPr>
-        <p:txBody>
-          <a:bodyPr>
-            <a:spAutoFit/>
-          </a:bodyPr>
-          <a:lstStyle>
-            <a:lvl1pPr marL="450850" indent="-450850" eaLnBrk="0" hangingPunct="0">
-              <a:defRPr>
-                <a:solidFill>
-                  <a:schemeClr val="tx1"/>
-                </a:solidFill>
-                <a:latin typeface="Arial" panose="020B0604020202020204" pitchFamily="34" charset="0"/>
-                <a:ea typeface="宋体" panose="02010600030101010101" pitchFamily="2" charset="-122"/>
-              </a:defRPr>
-            </a:lvl1pPr>
-            <a:lvl2pPr marL="742950" indent="-285750" eaLnBrk="0" hangingPunct="0">
-              <a:defRPr>
-                <a:solidFill>
-                  <a:schemeClr val="tx1"/>
-                </a:solidFill>
-                <a:latin typeface="Arial" panose="020B0604020202020204" pitchFamily="34" charset="0"/>
-                <a:ea typeface="宋体" panose="02010600030101010101" pitchFamily="2" charset="-122"/>
-              </a:defRPr>
-            </a:lvl2pPr>
-            <a:lvl3pPr marL="1143000" indent="-228600" eaLnBrk="0" hangingPunct="0">
-              <a:defRPr>
-                <a:solidFill>
-                  <a:schemeClr val="tx1"/>
-                </a:solidFill>
-                <a:latin typeface="Arial" panose="020B0604020202020204" pitchFamily="34" charset="0"/>
-                <a:ea typeface="宋体" panose="02010600030101010101" pitchFamily="2" charset="-122"/>
-              </a:defRPr>
-            </a:lvl3pPr>
-            <a:lvl4pPr marL="1600200" indent="-228600" eaLnBrk="0" hangingPunct="0">
-              <a:defRPr>
-                <a:solidFill>
-                  <a:schemeClr val="tx1"/>
-                </a:solidFill>
-                <a:latin typeface="Arial" panose="020B0604020202020204" pitchFamily="34" charset="0"/>
-                <a:ea typeface="宋体" panose="02010600030101010101" pitchFamily="2" charset="-122"/>
-              </a:defRPr>
-            </a:lvl4pPr>
-            <a:lvl5pPr marL="2057400" indent="-228600" eaLnBrk="0" hangingPunct="0">
-              <a:defRPr>
-                <a:solidFill>
-                  <a:schemeClr val="tx1"/>
-                </a:solidFill>
-                <a:latin typeface="Arial" panose="020B0604020202020204" pitchFamily="34" charset="0"/>
-                <a:ea typeface="宋体" panose="02010600030101010101" pitchFamily="2" charset="-122"/>
-              </a:defRPr>
-            </a:lvl5pPr>
-            <a:lvl6pPr marL="2514600" indent="-228600" eaLnBrk="0" fontAlgn="base" hangingPunct="0">
-              <a:spcBef>
-                <a:spcPct val="0"/>
-              </a:spcBef>
-              <a:spcAft>
-                <a:spcPct val="0"/>
-              </a:spcAft>
-              <a:buFont typeface="Arial" panose="020B0604020202020204" pitchFamily="34" charset="0"/>
-              <a:defRPr>
-                <a:solidFill>
-                  <a:schemeClr val="tx1"/>
-                </a:solidFill>
-                <a:latin typeface="Arial" panose="020B0604020202020204" pitchFamily="34" charset="0"/>
-                <a:ea typeface="宋体" panose="02010600030101010101" pitchFamily="2" charset="-122"/>
-              </a:defRPr>
-            </a:lvl6pPr>
-            <a:lvl7pPr marL="2971800" indent="-228600" eaLnBrk="0" fontAlgn="base" hangingPunct="0">
-              <a:spcBef>
-                <a:spcPct val="0"/>
-              </a:spcBef>
-              <a:spcAft>
-                <a:spcPct val="0"/>
-              </a:spcAft>
-              <a:buFont typeface="Arial" panose="020B0604020202020204" pitchFamily="34" charset="0"/>
-              <a:defRPr>
-                <a:solidFill>
-                  <a:schemeClr val="tx1"/>
-                </a:solidFill>
-                <a:latin typeface="Arial" panose="020B0604020202020204" pitchFamily="34" charset="0"/>
-                <a:ea typeface="宋体" panose="02010600030101010101" pitchFamily="2" charset="-122"/>
-              </a:defRPr>
-            </a:lvl7pPr>
-            <a:lvl8pPr marL="3429000" indent="-228600" eaLnBrk="0" fontAlgn="base" hangingPunct="0">
-              <a:spcBef>
-                <a:spcPct val="0"/>
-              </a:spcBef>
-              <a:spcAft>
-                <a:spcPct val="0"/>
-              </a:spcAft>
-              <a:buFont typeface="Arial" panose="020B0604020202020204" pitchFamily="34" charset="0"/>
-              <a:defRPr>
-                <a:solidFill>
-                  <a:schemeClr val="tx1"/>
-                </a:solidFill>
-                <a:latin typeface="Arial" panose="020B0604020202020204" pitchFamily="34" charset="0"/>
-                <a:ea typeface="宋体" panose="02010600030101010101" pitchFamily="2" charset="-122"/>
-              </a:defRPr>
-            </a:lvl8pPr>
-            <a:lvl9pPr marL="3886200" indent="-228600" eaLnBrk="0" fontAlgn="base" hangingPunct="0">
-              <a:spcBef>
-                <a:spcPct val="0"/>
-              </a:spcBef>
-              <a:spcAft>
-                <a:spcPct val="0"/>
-              </a:spcAft>
-              <a:buFont typeface="Arial" panose="020B0604020202020204" pitchFamily="34" charset="0"/>
-              <a:defRPr>
-                <a:solidFill>
-                  <a:schemeClr val="tx1"/>
-                </a:solidFill>
-                <a:latin typeface="Arial" panose="020B0604020202020204" pitchFamily="34" charset="0"/>
-                <a:ea typeface="宋体" panose="02010600030101010101" pitchFamily="2" charset="-122"/>
-              </a:defRPr>
-            </a:lvl9pPr>
-          </a:lstStyle>
-          <a:p>
-            <a:pPr algn="just" eaLnBrk="1" hangingPunct="1">
-              <a:lnSpc>
-                <a:spcPct val="120000"/>
-              </a:lnSpc>
-              <a:buFont typeface="Wingdings" panose="05000000000000000000" pitchFamily="2" charset="2"/>
-              <a:buChar char="q"/>
-            </a:pPr>
-            <a:r>
-              <a:rPr lang="en-US" altLang="zh-CN" sz="2400" b="1" dirty="0">
-                <a:solidFill>
-                  <a:srgbClr val="FF0000"/>
-                </a:solidFill>
-                <a:latin typeface="Times New Roman" panose="02020603050405020304" pitchFamily="18" charset="0"/>
-                <a:ea typeface="微软雅黑" panose="020B0503020204020204" charset="-122"/>
-                <a:sym typeface="Times New Roman" panose="02020603050405020304" pitchFamily="18" charset="0"/>
-              </a:rPr>
-              <a:t>垂直方向上的间隔</a:t>
-            </a:r>
-            <a:endParaRPr lang="en-US" altLang="zh-CN" sz="2400" b="1" dirty="0">
-              <a:solidFill>
-                <a:srgbClr val="FF0000"/>
-              </a:solidFill>
-              <a:latin typeface="Times New Roman" panose="02020603050405020304" pitchFamily="18" charset="0"/>
-              <a:ea typeface="微软雅黑" panose="020B0503020204020204" charset="-122"/>
-              <a:sym typeface="Times New Roman" panose="02020603050405020304" pitchFamily="18" charset="0"/>
-            </a:endParaRPr>
-          </a:p>
-          <a:p>
-            <a:pPr marL="0" indent="0" algn="just" eaLnBrk="1" hangingPunct="1">
-              <a:lnSpc>
-                <a:spcPct val="120000"/>
-              </a:lnSpc>
-              <a:buFont typeface="Wingdings" panose="05000000000000000000" pitchFamily="2" charset="2"/>
-              <a:buNone/>
-            </a:pPr>
-            <a:endParaRPr lang="zh-CN" altLang="en-US" sz="2200" dirty="0">
-              <a:solidFill>
-                <a:srgbClr val="17375E"/>
-              </a:solidFill>
-              <a:latin typeface="Times New Roman" panose="02020603050405020304" pitchFamily="18" charset="0"/>
-              <a:ea typeface="微软雅黑" panose="020B0503020204020204" charset="-122"/>
-              <a:sym typeface="Times New Roman" panose="02020603050405020304" pitchFamily="18" charset="0"/>
-            </a:endParaRPr>
-          </a:p>
-          <a:p>
-            <a:pPr marL="0" indent="0" algn="just" eaLnBrk="1" hangingPunct="1">
-              <a:lnSpc>
-                <a:spcPct val="120000"/>
-              </a:lnSpc>
-              <a:buFont typeface="Wingdings" panose="05000000000000000000" pitchFamily="2" charset="2"/>
-              <a:buNone/>
-            </a:pPr>
-            <a:endParaRPr lang="zh-CN" altLang="en-US" sz="2200" dirty="0">
-              <a:solidFill>
-                <a:srgbClr val="17375E"/>
-              </a:solidFill>
-              <a:latin typeface="Times New Roman" panose="02020603050405020304" pitchFamily="18" charset="0"/>
-              <a:ea typeface="微软雅黑" panose="020B0503020204020204" charset="-122"/>
-              <a:sym typeface="Times New Roman" panose="02020603050405020304" pitchFamily="18" charset="0"/>
-            </a:endParaRPr>
-          </a:p>
-        </p:txBody>
-      </p:sp>
       <p:pic>
         <p:nvPicPr>
           <p:cNvPr id="3" name="图片 2"/>
@@ -7390,15 +6883,15 @@
           <p:nvPr/>
         </p:nvPicPr>
         <p:blipFill>
-          <a:blip r:embed="rId1"/>
+          <a:blip r:embed="rId3"/>
           <a:stretch>
             <a:fillRect/>
           </a:stretch>
         </p:blipFill>
         <p:spPr>
           <a:xfrm>
-            <a:off x="251460" y="1581150"/>
-            <a:ext cx="4100195" cy="2371725"/>
+            <a:off x="181610" y="1604645"/>
+            <a:ext cx="4100195" cy="2800985"/>
           </a:xfrm>
           <a:prstGeom prst="rect">
             <a:avLst/>
@@ -7414,15 +6907,39 @@
           <p:nvPr/>
         </p:nvPicPr>
         <p:blipFill>
-          <a:blip r:embed="rId2"/>
+          <a:blip r:embed="rId4"/>
           <a:stretch>
             <a:fillRect/>
           </a:stretch>
         </p:blipFill>
         <p:spPr>
           <a:xfrm>
-            <a:off x="4351655" y="1581150"/>
-            <a:ext cx="4533265" cy="2371725"/>
+            <a:off x="4281805" y="1604645"/>
+            <a:ext cx="4533265" cy="2800985"/>
+          </a:xfrm>
+          <a:prstGeom prst="rect">
+            <a:avLst/>
+          </a:prstGeom>
+        </p:spPr>
+      </p:pic>
+      <p:pic>
+        <p:nvPicPr>
+          <p:cNvPr id="6" name="图片 5"/>
+          <p:cNvPicPr>
+            <a:picLocks noChangeAspect="1"/>
+          </p:cNvPicPr>
+          <p:nvPr/>
+        </p:nvPicPr>
+        <p:blipFill>
+          <a:blip r:embed="rId5"/>
+          <a:stretch>
+            <a:fillRect/>
+          </a:stretch>
+        </p:blipFill>
+        <p:spPr>
+          <a:xfrm>
+            <a:off x="172720" y="576580"/>
+            <a:ext cx="8797290" cy="4566920"/>
           </a:xfrm>
           <a:prstGeom prst="rect">
             <a:avLst/>
@@ -7440,14 +6957,178 @@
   <p:timing>
     <p:tnLst>
       <p:par>
-        <p:cTn id="1" dur="indefinite" restart="never" nodeType="tmRoot"/>
+        <p:cTn id="1" dur="indefinite" restart="never" nodeType="tmRoot">
+          <p:childTnLst>
+            <p:seq concurrent="1" nextAc="seek">
+              <p:cTn id="2" dur="indefinite" nodeType="mainSeq">
+                <p:childTnLst>
+                  <p:par>
+                    <p:cTn id="3" fill="hold">
+                      <p:stCondLst>
+                        <p:cond delay="indefinite"/>
+                      </p:stCondLst>
+                      <p:childTnLst>
+                        <p:par>
+                          <p:cTn id="4" fill="hold">
+                            <p:stCondLst>
+                              <p:cond delay="0"/>
+                            </p:stCondLst>
+                            <p:childTnLst>
+                              <p:par>
+                                <p:cTn id="5" presetID="3" presetClass="entr" presetSubtype="10" fill="hold" nodeType="clickEffect">
+                                  <p:stCondLst>
+                                    <p:cond delay="0"/>
+                                  </p:stCondLst>
+                                  <p:childTnLst>
+                                    <p:set>
+                                      <p:cBhvr>
+                                        <p:cTn id="6" dur="1" fill="hold">
+                                          <p:stCondLst>
+                                            <p:cond delay="0"/>
+                                          </p:stCondLst>
+                                        </p:cTn>
+                                        <p:tgtEl>
+                                          <p:spTgt spid="3"/>
+                                        </p:tgtEl>
+                                        <p:attrNameLst>
+                                          <p:attrName>style.visibility</p:attrName>
+                                        </p:attrNameLst>
+                                      </p:cBhvr>
+                                      <p:to>
+                                        <p:strVal val="visible"/>
+                                      </p:to>
+                                    </p:set>
+                                    <p:animEffect transition="in" filter="blinds(horizontal)">
+                                      <p:cBhvr>
+                                        <p:cTn id="7" dur="500"/>
+                                        <p:tgtEl>
+                                          <p:spTgt spid="3"/>
+                                        </p:tgtEl>
+                                      </p:cBhvr>
+                                    </p:animEffect>
+                                  </p:childTnLst>
+                                </p:cTn>
+                              </p:par>
+                              <p:par>
+                                <p:cTn id="8" presetID="3" presetClass="entr" presetSubtype="10" fill="hold" nodeType="withEffect">
+                                  <p:stCondLst>
+                                    <p:cond delay="0"/>
+                                  </p:stCondLst>
+                                  <p:childTnLst>
+                                    <p:set>
+                                      <p:cBhvr>
+                                        <p:cTn id="9" dur="1" fill="hold">
+                                          <p:stCondLst>
+                                            <p:cond delay="0"/>
+                                          </p:stCondLst>
+                                        </p:cTn>
+                                        <p:tgtEl>
+                                          <p:spTgt spid="5"/>
+                                        </p:tgtEl>
+                                        <p:attrNameLst>
+                                          <p:attrName>style.visibility</p:attrName>
+                                        </p:attrNameLst>
+                                      </p:cBhvr>
+                                      <p:to>
+                                        <p:strVal val="visible"/>
+                                      </p:to>
+                                    </p:set>
+                                    <p:animEffect transition="in" filter="blinds(horizontal)">
+                                      <p:cBhvr>
+                                        <p:cTn id="10" dur="500"/>
+                                        <p:tgtEl>
+                                          <p:spTgt spid="5"/>
+                                        </p:tgtEl>
+                                      </p:cBhvr>
+                                    </p:animEffect>
+                                  </p:childTnLst>
+                                </p:cTn>
+                              </p:par>
+                            </p:childTnLst>
+                          </p:cTn>
+                        </p:par>
+                      </p:childTnLst>
+                    </p:cTn>
+                  </p:par>
+                  <p:par>
+                    <p:cTn id="11" fill="hold">
+                      <p:stCondLst>
+                        <p:cond delay="indefinite"/>
+                      </p:stCondLst>
+                      <p:childTnLst>
+                        <p:par>
+                          <p:cTn id="12" fill="hold">
+                            <p:stCondLst>
+                              <p:cond delay="0"/>
+                            </p:stCondLst>
+                            <p:childTnLst>
+                              <p:par>
+                                <p:cTn id="13" presetID="3" presetClass="entr" presetSubtype="10" fill="hold" nodeType="clickEffect">
+                                  <p:stCondLst>
+                                    <p:cond delay="0"/>
+                                  </p:stCondLst>
+                                  <p:childTnLst>
+                                    <p:set>
+                                      <p:cBhvr>
+                                        <p:cTn id="14" dur="1" fill="hold">
+                                          <p:stCondLst>
+                                            <p:cond delay="0"/>
+                                          </p:stCondLst>
+                                        </p:cTn>
+                                        <p:tgtEl>
+                                          <p:spTgt spid="6"/>
+                                        </p:tgtEl>
+                                        <p:attrNameLst>
+                                          <p:attrName>style.visibility</p:attrName>
+                                        </p:attrNameLst>
+                                      </p:cBhvr>
+                                      <p:to>
+                                        <p:strVal val="visible"/>
+                                      </p:to>
+                                    </p:set>
+                                    <p:animEffect transition="in" filter="blinds(horizontal)">
+                                      <p:cBhvr>
+                                        <p:cTn id="15" dur="500"/>
+                                        <p:tgtEl>
+                                          <p:spTgt spid="6"/>
+                                        </p:tgtEl>
+                                      </p:cBhvr>
+                                    </p:animEffect>
+                                  </p:childTnLst>
+                                </p:cTn>
+                              </p:par>
+                            </p:childTnLst>
+                          </p:cTn>
+                        </p:par>
+                      </p:childTnLst>
+                    </p:cTn>
+                  </p:par>
+                </p:childTnLst>
+              </p:cTn>
+              <p:prevCondLst>
+                <p:cond evt="onPrev" delay="0">
+                  <p:tgtEl>
+                    <p:sldTgt/>
+                  </p:tgtEl>
+                </p:cond>
+              </p:prevCondLst>
+              <p:nextCondLst>
+                <p:cond evt="onNext" delay="0">
+                  <p:tgtEl>
+                    <p:sldTgt/>
+                  </p:tgtEl>
+                </p:cond>
+              </p:nextCondLst>
+            </p:seq>
+          </p:childTnLst>
+        </p:cTn>
       </p:par>
     </p:tnLst>
   </p:timing>
 </p:sld>
 </file>
 
-<file path=ppt/slides/slide17.xml><?xml version="1.0" encoding="utf-8"?>
+<file path=ppt/slides/slide16.xml><?xml version="1.0" encoding="utf-8"?>
 <p:sld xmlns:a="http://schemas.openxmlformats.org/drawingml/2006/main" xmlns:r="http://schemas.openxmlformats.org/officeDocument/2006/relationships" xmlns:p="http://schemas.openxmlformats.org/presentationml/2006/main">
   <p:cSld>
     <p:spTree>
@@ -7748,7 +7429,7 @@
 </p:sld>
 </file>
 
-<file path=ppt/slides/slide18.xml><?xml version="1.0" encoding="utf-8"?>
+<file path=ppt/slides/slide17.xml><?xml version="1.0" encoding="utf-8"?>
 <p:sld xmlns:a="http://schemas.openxmlformats.org/drawingml/2006/main" xmlns:r="http://schemas.openxmlformats.org/officeDocument/2006/relationships" xmlns:p="http://schemas.openxmlformats.org/presentationml/2006/main">
   <p:cSld>
     <p:spTree>
@@ -10299,7 +9980,7 @@
                   <a:srgbClr val="FF0000"/>
                 </a:solidFill>
               </a:rPr>
-              <a:t>难度大</a:t>
+              <a:t>随缘</a:t>
             </a:r>
             <a:endParaRPr lang="zh-CN" altLang="en-US" dirty="0">
               <a:solidFill>
@@ -12932,6 +12613,30 @@
           </a:prstGeom>
         </p:spPr>
       </p:pic>
+      <p:pic>
+        <p:nvPicPr>
+          <p:cNvPr id="4" name="图片 3"/>
+          <p:cNvPicPr>
+            <a:picLocks noChangeAspect="1"/>
+          </p:cNvPicPr>
+          <p:nvPr/>
+        </p:nvPicPr>
+        <p:blipFill>
+          <a:blip r:embed="rId3"/>
+          <a:stretch>
+            <a:fillRect/>
+          </a:stretch>
+        </p:blipFill>
+        <p:spPr>
+          <a:xfrm>
+            <a:off x="55880" y="1443990"/>
+            <a:ext cx="9032240" cy="3163570"/>
+          </a:xfrm>
+          <a:prstGeom prst="rect">
+            <a:avLst/>
+          </a:prstGeom>
+        </p:spPr>
+      </p:pic>
     </p:spTree>
   </p:cSld>
   <p:clrMapOvr>
@@ -12943,7 +12648,83 @@
   <p:timing>
     <p:tnLst>
       <p:par>
-        <p:cTn id="1" dur="indefinite" restart="never" nodeType="tmRoot"/>
+        <p:cTn id="1" dur="indefinite" restart="never" nodeType="tmRoot">
+          <p:childTnLst>
+            <p:seq concurrent="1" nextAc="seek">
+              <p:cTn id="2" dur="indefinite" nodeType="mainSeq">
+                <p:childTnLst>
+                  <p:par>
+                    <p:cTn id="3" fill="hold">
+                      <p:stCondLst>
+                        <p:cond delay="indefinite"/>
+                      </p:stCondLst>
+                      <p:childTnLst>
+                        <p:par>
+                          <p:cTn id="4" fill="hold">
+                            <p:stCondLst>
+                              <p:cond delay="0"/>
+                            </p:stCondLst>
+                            <p:childTnLst>
+                              <p:par>
+                                <p:cTn id="5" presetID="3" presetClass="entr" presetSubtype="10" fill="hold" nodeType="clickEffect">
+                                  <p:stCondLst>
+                                    <p:cond delay="0"/>
+                                  </p:stCondLst>
+                                  <p:childTnLst>
+                                    <p:set>
+                                      <p:cBhvr>
+                                        <p:cTn id="6" dur="1" fill="hold">
+                                          <p:stCondLst>
+                                            <p:cond delay="0"/>
+                                          </p:stCondLst>
+                                        </p:cTn>
+                                        <p:tgtEl>
+                                          <p:spTgt spid="4"/>
+                                        </p:tgtEl>
+                                        <p:attrNameLst>
+                                          <p:attrName>style.visibility</p:attrName>
+                                        </p:attrNameLst>
+                                      </p:cBhvr>
+                                      <p:to>
+                                        <p:strVal val="visible"/>
+                                      </p:to>
+                                    </p:set>
+                                    <p:animEffect transition="in" filter="blinds(horizontal)">
+                                      <p:cBhvr>
+                                        <p:cTn id="7" dur="500"/>
+                                        <p:tgtEl>
+                                          <p:spTgt spid="4"/>
+                                        </p:tgtEl>
+                                      </p:cBhvr>
+                                    </p:animEffect>
+                                  </p:childTnLst>
+                                </p:cTn>
+                              </p:par>
+                            </p:childTnLst>
+                          </p:cTn>
+                        </p:par>
+                      </p:childTnLst>
+                    </p:cTn>
+                  </p:par>
+                </p:childTnLst>
+              </p:cTn>
+              <p:prevCondLst>
+                <p:cond evt="onPrev" delay="0">
+                  <p:tgtEl>
+                    <p:sldTgt/>
+                  </p:tgtEl>
+                </p:cond>
+              </p:prevCondLst>
+              <p:nextCondLst>
+                <p:cond evt="onNext" delay="0">
+                  <p:tgtEl>
+                    <p:sldTgt/>
+                  </p:tgtEl>
+                </p:cond>
+              </p:nextCondLst>
+            </p:seq>
+          </p:childTnLst>
+        </p:cTn>
       </p:par>
     </p:tnLst>
   </p:timing>
@@ -14893,7 +14674,7 @@
         <p:spPr bwMode="auto">
           <a:xfrm>
             <a:off x="251143" y="888683"/>
-            <a:ext cx="8640762" cy="2859405"/>
+            <a:ext cx="8640762" cy="3670935"/>
           </a:xfrm>
           <a:prstGeom prst="rect">
             <a:avLst/>
@@ -15422,7 +15203,129 @@
               <a:buFont typeface="Wingdings" panose="05000000000000000000" pitchFamily="2" charset="2"/>
               <a:buNone/>
             </a:pPr>
+            <a:r>
+              <a:rPr lang="zh-CN" altLang="en-US" sz="2200" dirty="0">
+                <a:solidFill>
+                  <a:srgbClr val="17375E"/>
+                </a:solidFill>
+                <a:latin typeface="Times New Roman" panose="02020603050405020304" pitchFamily="18" charset="0"/>
+                <a:ea typeface="微软雅黑" panose="020B0503020204020204" charset="-122"/>
+                <a:sym typeface="Times New Roman" panose="02020603050405020304" pitchFamily="18" charset="0"/>
+              </a:rPr>
+              <a:t>针对不同对象，可能需要不同变量去区分</a:t>
+            </a:r>
+            <a:endParaRPr lang="zh-CN" altLang="en-US" sz="2200" dirty="0">
+              <a:solidFill>
+                <a:srgbClr val="17375E"/>
+              </a:solidFill>
+              <a:latin typeface="Times New Roman" panose="02020603050405020304" pitchFamily="18" charset="0"/>
+              <a:ea typeface="微软雅黑" panose="020B0503020204020204" charset="-122"/>
+              <a:sym typeface="Times New Roman" panose="02020603050405020304" pitchFamily="18" charset="0"/>
+            </a:endParaRPr>
+          </a:p>
+          <a:p>
+            <a:pPr marL="0" indent="0" algn="just" eaLnBrk="1" hangingPunct="1">
+              <a:lnSpc>
+                <a:spcPct val="120000"/>
+              </a:lnSpc>
+              <a:buFont typeface="Wingdings" panose="05000000000000000000" pitchFamily="2" charset="2"/>
+              <a:buNone/>
+            </a:pPr>
+            <a:r>
+              <a:rPr lang="zh-CN" altLang="en-US" sz="2200" dirty="0">
+                <a:solidFill>
+                  <a:srgbClr val="17375E"/>
+                </a:solidFill>
+                <a:latin typeface="Times New Roman" panose="02020603050405020304" pitchFamily="18" charset="0"/>
+                <a:ea typeface="微软雅黑" panose="020B0503020204020204" charset="-122"/>
+                <a:sym typeface="Times New Roman" panose="02020603050405020304" pitchFamily="18" charset="0"/>
+              </a:rPr>
+              <a:t>但只是简单的</a:t>
+            </a:r>
+            <a:r>
+              <a:rPr lang="en-US" altLang="zh-CN" sz="2200" dirty="0">
+                <a:solidFill>
+                  <a:srgbClr val="17375E"/>
+                </a:solidFill>
+                <a:latin typeface="Times New Roman" panose="02020603050405020304" pitchFamily="18" charset="0"/>
+                <a:ea typeface="微软雅黑" panose="020B0503020204020204" charset="-122"/>
+                <a:sym typeface="Times New Roman" panose="02020603050405020304" pitchFamily="18" charset="0"/>
+              </a:rPr>
+              <a:t>a1</a:t>
+            </a:r>
+            <a:r>
+              <a:rPr lang="zh-CN" altLang="en-US" sz="2200" dirty="0">
+                <a:solidFill>
+                  <a:srgbClr val="17375E"/>
+                </a:solidFill>
+                <a:latin typeface="Times New Roman" panose="02020603050405020304" pitchFamily="18" charset="0"/>
+                <a:ea typeface="微软雅黑" panose="020B0503020204020204" charset="-122"/>
+                <a:sym typeface="Times New Roman" panose="02020603050405020304" pitchFamily="18" charset="0"/>
+              </a:rPr>
+              <a:t>、</a:t>
+            </a:r>
+            <a:r>
+              <a:rPr lang="en-US" altLang="zh-CN" sz="2200" dirty="0">
+                <a:solidFill>
+                  <a:srgbClr val="17375E"/>
+                </a:solidFill>
+                <a:latin typeface="Times New Roman" panose="02020603050405020304" pitchFamily="18" charset="0"/>
+                <a:ea typeface="微软雅黑" panose="020B0503020204020204" charset="-122"/>
+                <a:sym typeface="Times New Roman" panose="02020603050405020304" pitchFamily="18" charset="0"/>
+              </a:rPr>
+              <a:t>a2</a:t>
+            </a:r>
+            <a:r>
+              <a:rPr lang="zh-CN" altLang="en-US" sz="2200" dirty="0">
+                <a:solidFill>
+                  <a:srgbClr val="17375E"/>
+                </a:solidFill>
+                <a:latin typeface="Times New Roman" panose="02020603050405020304" pitchFamily="18" charset="0"/>
+                <a:ea typeface="微软雅黑" panose="020B0503020204020204" charset="-122"/>
+                <a:sym typeface="Times New Roman" panose="02020603050405020304" pitchFamily="18" charset="0"/>
+              </a:rPr>
+              <a:t>、</a:t>
+            </a:r>
+            <a:r>
+              <a:rPr lang="en-US" altLang="zh-CN" sz="2200" dirty="0">
+                <a:solidFill>
+                  <a:srgbClr val="17375E"/>
+                </a:solidFill>
+                <a:latin typeface="Times New Roman" panose="02020603050405020304" pitchFamily="18" charset="0"/>
+                <a:ea typeface="微软雅黑" panose="020B0503020204020204" charset="-122"/>
+                <a:sym typeface="Times New Roman" panose="02020603050405020304" pitchFamily="18" charset="0"/>
+              </a:rPr>
+              <a:t>a3</a:t>
+            </a:r>
             <a:endParaRPr lang="en-US" altLang="zh-CN" sz="2200" dirty="0">
+              <a:solidFill>
+                <a:srgbClr val="17375E"/>
+              </a:solidFill>
+              <a:latin typeface="Times New Roman" panose="02020603050405020304" pitchFamily="18" charset="0"/>
+              <a:ea typeface="微软雅黑" panose="020B0503020204020204" charset="-122"/>
+              <a:sym typeface="Times New Roman" panose="02020603050405020304" pitchFamily="18" charset="0"/>
+            </a:endParaRPr>
+          </a:p>
+          <a:p>
+            <a:pPr marL="0" indent="0" algn="just" eaLnBrk="1" hangingPunct="1">
+              <a:lnSpc>
+                <a:spcPct val="120000"/>
+              </a:lnSpc>
+              <a:buFont typeface="Wingdings" panose="05000000000000000000" pitchFamily="2" charset="2"/>
+              <a:buNone/>
+            </a:pPr>
+            <a:r>
+              <a:rPr lang="zh-CN" altLang="en-US" sz="2200" dirty="0">
+                <a:solidFill>
+                  <a:srgbClr val="17375E"/>
+                </a:solidFill>
+                <a:latin typeface="Times New Roman" panose="02020603050405020304" pitchFamily="18" charset="0"/>
+                <a:ea typeface="微软雅黑" panose="020B0503020204020204" charset="-122"/>
+                <a:sym typeface="Times New Roman" panose="02020603050405020304" pitchFamily="18" charset="0"/>
+              </a:rPr>
+              <a:t>没有实际的意义，阻塞理解</a:t>
+            </a:r>
+            <a:endParaRPr lang="zh-CN" altLang="en-US" sz="2200" dirty="0">
               <a:solidFill>
                 <a:srgbClr val="17375E"/>
               </a:solidFill>
@@ -15449,8 +15352,80 @@
         </p:blipFill>
         <p:spPr>
           <a:xfrm>
-            <a:off x="2656840" y="2914015"/>
-            <a:ext cx="6458585" cy="2225040"/>
+            <a:off x="337185" y="3362960"/>
+            <a:ext cx="5559425" cy="1754505"/>
+          </a:xfrm>
+          <a:prstGeom prst="rect">
+            <a:avLst/>
+          </a:prstGeom>
+        </p:spPr>
+      </p:pic>
+      <p:pic>
+        <p:nvPicPr>
+          <p:cNvPr id="6" name="图片 5"/>
+          <p:cNvPicPr>
+            <a:picLocks noChangeAspect="1"/>
+          </p:cNvPicPr>
+          <p:nvPr/>
+        </p:nvPicPr>
+        <p:blipFill>
+          <a:blip r:embed="rId2"/>
+          <a:stretch>
+            <a:fillRect/>
+          </a:stretch>
+        </p:blipFill>
+        <p:spPr>
+          <a:xfrm>
+            <a:off x="337185" y="1361440"/>
+            <a:ext cx="3390900" cy="1314450"/>
+          </a:xfrm>
+          <a:prstGeom prst="rect">
+            <a:avLst/>
+          </a:prstGeom>
+        </p:spPr>
+      </p:pic>
+      <p:pic>
+        <p:nvPicPr>
+          <p:cNvPr id="7" name="图片 6"/>
+          <p:cNvPicPr>
+            <a:picLocks noChangeAspect="1"/>
+          </p:cNvPicPr>
+          <p:nvPr/>
+        </p:nvPicPr>
+        <p:blipFill>
+          <a:blip r:embed="rId3"/>
+          <a:stretch>
+            <a:fillRect/>
+          </a:stretch>
+        </p:blipFill>
+        <p:spPr>
+          <a:xfrm>
+            <a:off x="3649980" y="1361440"/>
+            <a:ext cx="4530090" cy="1314450"/>
+          </a:xfrm>
+          <a:prstGeom prst="rect">
+            <a:avLst/>
+          </a:prstGeom>
+        </p:spPr>
+      </p:pic>
+      <p:pic>
+        <p:nvPicPr>
+          <p:cNvPr id="9" name="图片 8"/>
+          <p:cNvPicPr>
+            <a:picLocks noChangeAspect="1"/>
+          </p:cNvPicPr>
+          <p:nvPr/>
+        </p:nvPicPr>
+        <p:blipFill>
+          <a:blip r:embed="rId4"/>
+          <a:stretch>
+            <a:fillRect/>
+          </a:stretch>
+        </p:blipFill>
+        <p:spPr>
+          <a:xfrm>
+            <a:off x="5534660" y="3362960"/>
+            <a:ext cx="2645410" cy="1743075"/>
           </a:xfrm>
           <a:prstGeom prst="rect">
             <a:avLst/>
@@ -15468,7 +15443,188 @@
   <p:timing>
     <p:tnLst>
       <p:par>
-        <p:cTn id="1" dur="indefinite" restart="never" nodeType="tmRoot"/>
+        <p:cTn id="1" dur="indefinite" restart="never" nodeType="tmRoot">
+          <p:childTnLst>
+            <p:seq concurrent="1" nextAc="seek">
+              <p:cTn id="2" dur="indefinite" nodeType="mainSeq">
+                <p:childTnLst>
+                  <p:par>
+                    <p:cTn id="3" fill="hold">
+                      <p:stCondLst>
+                        <p:cond delay="indefinite"/>
+                      </p:stCondLst>
+                      <p:childTnLst>
+                        <p:par>
+                          <p:cTn id="4" fill="hold">
+                            <p:stCondLst>
+                              <p:cond delay="0"/>
+                            </p:stCondLst>
+                            <p:childTnLst>
+                              <p:par>
+                                <p:cTn id="5" presetID="3" presetClass="entr" presetSubtype="10" fill="hold" nodeType="clickEffect">
+                                  <p:stCondLst>
+                                    <p:cond delay="0"/>
+                                  </p:stCondLst>
+                                  <p:childTnLst>
+                                    <p:set>
+                                      <p:cBhvr>
+                                        <p:cTn id="6" dur="1" fill="hold">
+                                          <p:stCondLst>
+                                            <p:cond delay="0"/>
+                                          </p:stCondLst>
+                                        </p:cTn>
+                                        <p:tgtEl>
+                                          <p:spTgt spid="6"/>
+                                        </p:tgtEl>
+                                        <p:attrNameLst>
+                                          <p:attrName>style.visibility</p:attrName>
+                                        </p:attrNameLst>
+                                      </p:cBhvr>
+                                      <p:to>
+                                        <p:strVal val="visible"/>
+                                      </p:to>
+                                    </p:set>
+                                    <p:animEffect transition="in" filter="blinds(horizontal)">
+                                      <p:cBhvr>
+                                        <p:cTn id="7" dur="500"/>
+                                        <p:tgtEl>
+                                          <p:spTgt spid="6"/>
+                                        </p:tgtEl>
+                                      </p:cBhvr>
+                                    </p:animEffect>
+                                  </p:childTnLst>
+                                </p:cTn>
+                              </p:par>
+                              <p:par>
+                                <p:cTn id="8" presetID="3" presetClass="entr" presetSubtype="10" fill="hold" nodeType="withEffect">
+                                  <p:stCondLst>
+                                    <p:cond delay="0"/>
+                                  </p:stCondLst>
+                                  <p:childTnLst>
+                                    <p:set>
+                                      <p:cBhvr>
+                                        <p:cTn id="9" dur="1" fill="hold">
+                                          <p:stCondLst>
+                                            <p:cond delay="0"/>
+                                          </p:stCondLst>
+                                        </p:cTn>
+                                        <p:tgtEl>
+                                          <p:spTgt spid="7"/>
+                                        </p:tgtEl>
+                                        <p:attrNameLst>
+                                          <p:attrName>style.visibility</p:attrName>
+                                        </p:attrNameLst>
+                                      </p:cBhvr>
+                                      <p:to>
+                                        <p:strVal val="visible"/>
+                                      </p:to>
+                                    </p:set>
+                                    <p:animEffect transition="in" filter="blinds(horizontal)">
+                                      <p:cBhvr>
+                                        <p:cTn id="10" dur="500"/>
+                                        <p:tgtEl>
+                                          <p:spTgt spid="7"/>
+                                        </p:tgtEl>
+                                      </p:cBhvr>
+                                    </p:animEffect>
+                                  </p:childTnLst>
+                                </p:cTn>
+                              </p:par>
+                              <p:par>
+                                <p:cTn id="11" presetID="3" presetClass="entr" presetSubtype="10" fill="hold" nodeType="withEffect">
+                                  <p:stCondLst>
+                                    <p:cond delay="0"/>
+                                  </p:stCondLst>
+                                  <p:childTnLst>
+                                    <p:set>
+                                      <p:cBhvr>
+                                        <p:cTn id="12" dur="1" fill="hold">
+                                          <p:stCondLst>
+                                            <p:cond delay="0"/>
+                                          </p:stCondLst>
+                                        </p:cTn>
+                                        <p:tgtEl>
+                                          <p:spTgt spid="3"/>
+                                        </p:tgtEl>
+                                        <p:attrNameLst>
+                                          <p:attrName>style.visibility</p:attrName>
+                                        </p:attrNameLst>
+                                      </p:cBhvr>
+                                      <p:to>
+                                        <p:strVal val="visible"/>
+                                      </p:to>
+                                    </p:set>
+                                    <p:animEffect transition="in" filter="blinds(horizontal)">
+                                      <p:cBhvr>
+                                        <p:cTn id="13" dur="500"/>
+                                        <p:tgtEl>
+                                          <p:spTgt spid="3"/>
+                                        </p:tgtEl>
+                                      </p:cBhvr>
+                                    </p:animEffect>
+                                  </p:childTnLst>
+                                </p:cTn>
+                              </p:par>
+                              <p:par>
+                                <p:cTn id="14" presetID="3" presetClass="entr" presetSubtype="10" fill="hold" nodeType="withEffect">
+                                  <p:stCondLst>
+                                    <p:cond delay="0"/>
+                                  </p:stCondLst>
+                                  <p:childTnLst>
+                                    <p:set>
+                                      <p:cBhvr>
+                                        <p:cTn id="15" dur="1" fill="hold">
+                                          <p:stCondLst>
+                                            <p:cond delay="0"/>
+                                          </p:stCondLst>
+                                        </p:cTn>
+                                        <p:tgtEl>
+                                          <p:spTgt spid="9"/>
+                                        </p:tgtEl>
+                                        <p:attrNameLst>
+                                          <p:attrName>style.visibility</p:attrName>
+                                        </p:attrNameLst>
+                                      </p:cBhvr>
+                                      <p:to>
+                                        <p:strVal val="visible"/>
+                                      </p:to>
+                                    </p:set>
+                                    <p:animEffect transition="in" filter="blinds(horizontal)">
+                                      <p:cBhvr>
+                                        <p:cTn id="16" dur="500"/>
+                                        <p:tgtEl>
+                                          <p:spTgt spid="9"/>
+                                        </p:tgtEl>
+                                      </p:cBhvr>
+                                    </p:animEffect>
+                                  </p:childTnLst>
+                                </p:cTn>
+                              </p:par>
+                            </p:childTnLst>
+                          </p:cTn>
+                        </p:par>
+                      </p:childTnLst>
+                    </p:cTn>
+                  </p:par>
+                </p:childTnLst>
+              </p:cTn>
+              <p:prevCondLst>
+                <p:cond evt="onPrev" delay="0">
+                  <p:tgtEl>
+                    <p:sldTgt/>
+                  </p:tgtEl>
+                </p:cond>
+              </p:prevCondLst>
+              <p:nextCondLst>
+                <p:cond evt="onNext" delay="0">
+                  <p:tgtEl>
+                    <p:sldTgt/>
+                  </p:tgtEl>
+                </p:cond>
+              </p:nextCondLst>
+            </p:seq>
+          </p:childTnLst>
+        </p:cTn>
       </p:par>
     </p:tnLst>
   </p:timing>
@@ -15501,7 +15657,7 @@
         <p:spPr>
           <a:xfrm>
             <a:off x="476520" y="430384"/>
-            <a:ext cx="3870455" cy="398780"/>
+            <a:ext cx="3870455" cy="245110"/>
           </a:xfrm>
           <a:prstGeom prst="rect">
             <a:avLst/>
@@ -15514,7 +15670,7 @@
           <a:lstStyle/>
           <a:p>
             <a:r>
-              <a:rPr lang="en-US" altLang="zh-CN" sz="1000" dirty="0">
+              <a:rPr lang="en-US" sz="1000" dirty="0">
                 <a:solidFill>
                   <a:schemeClr val="tx1">
                     <a:lumMod val="50000"/>
@@ -15522,18 +15678,8 @@
                   </a:schemeClr>
                 </a:solidFill>
               </a:rPr>
-              <a:t>Enterprise intelligent demand.</a:t>
-            </a:r>
-            <a:endParaRPr lang="en-US" altLang="zh-CN" sz="1000" dirty="0">
-              <a:solidFill>
-                <a:schemeClr val="tx1">
-                  <a:lumMod val="50000"/>
-                  <a:lumOff val="50000"/>
-                </a:schemeClr>
-              </a:solidFill>
-            </a:endParaRPr>
-          </a:p>
-          <a:p>
+              <a:t>meaningful naming</a:t>
+            </a:r>
             <a:endParaRPr lang="en-US" sz="1000" dirty="0">
               <a:solidFill>
                 <a:schemeClr val="tx1">
@@ -17357,7 +17503,7 @@
         <p:spPr>
           <a:xfrm>
             <a:off x="461598" y="61052"/>
-            <a:ext cx="1783080" cy="368300"/>
+            <a:ext cx="2536825" cy="368300"/>
           </a:xfrm>
           <a:prstGeom prst="rect">
             <a:avLst/>
@@ -17370,7 +17516,7 @@
           <a:lstStyle/>
           <a:p>
             <a:r>
-              <a:rPr lang="zh-CN" altLang="en-US" b="1" dirty="0">
+              <a:rPr lang="zh-CN" altLang="zh-CN" b="1" dirty="0">
                 <a:solidFill>
                   <a:schemeClr val="tx1">
                     <a:lumMod val="85000"/>
@@ -17379,7 +17525,31 @@
                 </a:solidFill>
                 <a:latin typeface="Impact" panose="020B0806030902050204" pitchFamily="34" charset="0"/>
               </a:rPr>
-              <a:t>企业智能化需求</a:t>
+              <a:t>代码规范</a:t>
+            </a:r>
+            <a:r>
+              <a:rPr lang="en-US" altLang="zh-CN" b="1" dirty="0">
+                <a:solidFill>
+                  <a:schemeClr val="tx1">
+                    <a:lumMod val="85000"/>
+                    <a:lumOff val="15000"/>
+                  </a:schemeClr>
+                </a:solidFill>
+                <a:latin typeface="Impact" panose="020B0806030902050204" pitchFamily="34" charset="0"/>
+              </a:rPr>
+              <a:t>-</a:t>
+            </a:r>
+            <a:r>
+              <a:rPr lang="zh-CN" altLang="en-US" b="1" dirty="0">
+                <a:solidFill>
+                  <a:schemeClr val="tx1">
+                    <a:lumMod val="85000"/>
+                    <a:lumOff val="15000"/>
+                  </a:schemeClr>
+                </a:solidFill>
+                <a:latin typeface="Impact" panose="020B0806030902050204" pitchFamily="34" charset="0"/>
+              </a:rPr>
+              <a:t>有意义的命名</a:t>
             </a:r>
             <a:endParaRPr lang="zh-CN" altLang="en-US" b="1" dirty="0">
               <a:solidFill>
@@ -17756,6 +17926,30 @@
           </a:prstGeom>
         </p:spPr>
       </p:pic>
+      <p:pic>
+        <p:nvPicPr>
+          <p:cNvPr id="5" name="图片 4"/>
+          <p:cNvPicPr>
+            <a:picLocks noChangeAspect="1"/>
+          </p:cNvPicPr>
+          <p:nvPr/>
+        </p:nvPicPr>
+        <p:blipFill>
+          <a:blip r:embed="rId3"/>
+          <a:stretch>
+            <a:fillRect/>
+          </a:stretch>
+        </p:blipFill>
+        <p:spPr>
+          <a:xfrm>
+            <a:off x="2845435" y="921385"/>
+            <a:ext cx="4318635" cy="1847850"/>
+          </a:xfrm>
+          <a:prstGeom prst="rect">
+            <a:avLst/>
+          </a:prstGeom>
+        </p:spPr>
+      </p:pic>
     </p:spTree>
   </p:cSld>
   <p:clrMapOvr>
@@ -17767,7 +17961,83 @@
   <p:timing>
     <p:tnLst>
       <p:par>
-        <p:cTn id="1" dur="indefinite" restart="never" nodeType="tmRoot"/>
+        <p:cTn id="1" dur="indefinite" restart="never" nodeType="tmRoot">
+          <p:childTnLst>
+            <p:seq concurrent="1" nextAc="seek">
+              <p:cTn id="2" dur="indefinite" nodeType="mainSeq">
+                <p:childTnLst>
+                  <p:par>
+                    <p:cTn id="3" fill="hold">
+                      <p:stCondLst>
+                        <p:cond delay="indefinite"/>
+                      </p:stCondLst>
+                      <p:childTnLst>
+                        <p:par>
+                          <p:cTn id="4" fill="hold">
+                            <p:stCondLst>
+                              <p:cond delay="0"/>
+                            </p:stCondLst>
+                            <p:childTnLst>
+                              <p:par>
+                                <p:cTn id="5" presetID="3" presetClass="entr" presetSubtype="10" fill="hold" nodeType="clickEffect">
+                                  <p:stCondLst>
+                                    <p:cond delay="0"/>
+                                  </p:stCondLst>
+                                  <p:childTnLst>
+                                    <p:set>
+                                      <p:cBhvr>
+                                        <p:cTn id="6" dur="1" fill="hold">
+                                          <p:stCondLst>
+                                            <p:cond delay="0"/>
+                                          </p:stCondLst>
+                                        </p:cTn>
+                                        <p:tgtEl>
+                                          <p:spTgt spid="5"/>
+                                        </p:tgtEl>
+                                        <p:attrNameLst>
+                                          <p:attrName>style.visibility</p:attrName>
+                                        </p:attrNameLst>
+                                      </p:cBhvr>
+                                      <p:to>
+                                        <p:strVal val="visible"/>
+                                      </p:to>
+                                    </p:set>
+                                    <p:animEffect transition="in" filter="blinds(horizontal)">
+                                      <p:cBhvr>
+                                        <p:cTn id="7" dur="500"/>
+                                        <p:tgtEl>
+                                          <p:spTgt spid="5"/>
+                                        </p:tgtEl>
+                                      </p:cBhvr>
+                                    </p:animEffect>
+                                  </p:childTnLst>
+                                </p:cTn>
+                              </p:par>
+                            </p:childTnLst>
+                          </p:cTn>
+                        </p:par>
+                      </p:childTnLst>
+                    </p:cTn>
+                  </p:par>
+                </p:childTnLst>
+              </p:cTn>
+              <p:prevCondLst>
+                <p:cond evt="onPrev" delay="0">
+                  <p:tgtEl>
+                    <p:sldTgt/>
+                  </p:tgtEl>
+                </p:cond>
+              </p:prevCondLst>
+              <p:nextCondLst>
+                <p:cond evt="onNext" delay="0">
+                  <p:tgtEl>
+                    <p:sldTgt/>
+                  </p:tgtEl>
+                </p:cond>
+              </p:nextCondLst>
+            </p:seq>
+          </p:childTnLst>
+        </p:cTn>
       </p:par>
     </p:tnLst>
   </p:timing>

</xml_diff>